<commit_message>
Add more details to exercise 4
</commit_message>
<xml_diff>
--- a/slides/Intro.pptx
+++ b/slides/Intro.pptx
@@ -5592,14 +5592,14 @@
             <p:ph idx="1"/>
             <p:extLst>
               <p:ext uri="{D42A27DB-BD31-4B8C-83A1-F6EECF244321}">
-                <p14:modId xmlns:p14="http://schemas.microsoft.com/office/powerpoint/2010/main" val="1603280743"/>
+                <p14:modId xmlns:p14="http://schemas.microsoft.com/office/powerpoint/2010/main" val="68151832"/>
               </p:ext>
             </p:extLst>
           </p:nvPr>
         </p:nvGraphicFramePr>
         <p:xfrm>
           <a:off x="773113" y="1789113"/>
-          <a:ext cx="11215688" cy="4892040"/>
+          <a:ext cx="11215688" cy="4993640"/>
         </p:xfrm>
         <a:graphic>
           <a:graphicData uri="http://schemas.openxmlformats.org/drawingml/2006/table">
@@ -5679,20 +5679,8 @@
                     <a:lstStyle/>
                     <a:p>
                       <a:r>
-                        <a:rPr lang="en-GB" dirty="0" smtClean="0"/>
-                        <a:t>Spring</a:t>
-                      </a:r>
-                      <a:r>
                         <a:rPr lang="en-GB" baseline="0" dirty="0" smtClean="0"/>
-                        <a:t> </a:t>
-                      </a:r>
-                      <a:r>
-                        <a:rPr lang="en-GB" baseline="0" smtClean="0"/>
-                        <a:t>Boot </a:t>
-                      </a:r>
-                      <a:r>
-                        <a:rPr lang="en-GB" baseline="0" smtClean="0"/>
-                        <a:t>Configuration and Feign </a:t>
+                        <a:t>Service Integration </a:t>
                       </a:r>
                       <a:r>
                         <a:rPr lang="en-GB" b="1" baseline="0" dirty="0" smtClean="0"/>
@@ -5735,15 +5723,13 @@
                       </a:r>
                       <a:r>
                         <a:rPr lang="en-GB" dirty="0" smtClean="0"/>
-                        <a:t> “Get some real movies”</a:t>
-                      </a:r>
-                    </a:p>
-                    <a:p>
+                        <a:t> “Get some real movies</a:t>
+                      </a:r>
                       <a:r>
                         <a:rPr lang="en-GB" dirty="0" smtClean="0"/>
-                        <a:t>Tests</a:t>
-                      </a:r>
-                      <a:endParaRPr lang="en-GB" dirty="0"/>
+                        <a:t>”</a:t>
+                      </a:r>
+                      <a:endParaRPr lang="en-GB" dirty="0" smtClean="0"/>
                     </a:p>
                   </a:txBody>
                   <a:tcPr/>
@@ -5751,6 +5737,49 @@
                 <a:extLst>
                   <a:ext uri="{0D108BD9-81ED-4DB2-BD59-A6C34878D82A}">
                     <a16:rowId xmlns:a16="http://schemas.microsoft.com/office/drawing/2014/main" val="139490186"/>
+                  </a:ext>
+                </a:extLst>
+              </a:tr>
+              <a:tr h="370840">
+                <a:tc>
+                  <a:txBody>
+                    <a:bodyPr/>
+                    <a:lstStyle/>
+                    <a:p>
+                      <a:r>
+                        <a:rPr lang="en-GB" dirty="0" smtClean="0"/>
+                        <a:t>13:45</a:t>
+                      </a:r>
+                      <a:endParaRPr lang="en-GB" dirty="0"/>
+                    </a:p>
+                  </a:txBody>
+                  <a:tcPr/>
+                </a:tc>
+                <a:tc>
+                  <a:txBody>
+                    <a:bodyPr/>
+                    <a:lstStyle/>
+                    <a:p>
+                      <a:r>
+                        <a:rPr lang="en-GB" dirty="0" smtClean="0"/>
+                        <a:t>Spring Boot Configuration </a:t>
+                      </a:r>
+                      <a:r>
+                        <a:rPr lang="en-GB" b="1" dirty="0" smtClean="0"/>
+                        <a:t>new</a:t>
+                      </a:r>
+                      <a:r>
+                        <a:rPr lang="en-GB" b="1" baseline="0" dirty="0" smtClean="0"/>
+                        <a:t> Slides</a:t>
+                      </a:r>
+                      <a:endParaRPr lang="en-GB" b="1" dirty="0"/>
+                    </a:p>
+                  </a:txBody>
+                  <a:tcPr/>
+                </a:tc>
+                <a:extLst>
+                  <a:ext uri="{0D108BD9-81ED-4DB2-BD59-A6C34878D82A}">
+                    <a16:rowId xmlns:a16="http://schemas.microsoft.com/office/drawing/2014/main" val="1353231885"/>
                   </a:ext>
                 </a:extLst>
               </a:tr>

</xml_diff>